<commit_message>
Squashed commit of the following:
commit 6c07e431dc3feef7680fc75c09c01c1fef6cbf41
Author: shinzawa44 <skslowlysleepy@ezweb.ne.jp>
Date:   Fri Jun 2 20:37:31 2017 +0900

    楽譜を修正
</commit_message>
<xml_diff>
--- a/なんちゃってコード進行.pptx
+++ b/なんちゃってコード進行.pptx
@@ -18,11 +18,11 @@
     <p:sldId id="264" r:id="rId9"/>
     <p:sldId id="266" r:id="rId10"/>
     <p:sldId id="268" r:id="rId11"/>
-    <p:sldId id="269" r:id="rId12"/>
-    <p:sldId id="270" r:id="rId13"/>
-    <p:sldId id="271" r:id="rId14"/>
+    <p:sldId id="270" r:id="rId12"/>
+    <p:sldId id="271" r:id="rId13"/>
+    <p:sldId id="265" r:id="rId14"/>
     <p:sldId id="260" r:id="rId15"/>
-    <p:sldId id="265" r:id="rId16"/>
+    <p:sldId id="269" r:id="rId16"/>
     <p:sldId id="256" r:id="rId17"/>
   </p:sldIdLst>
   <p:sldSz cx="12192000" cy="6858000"/>
@@ -212,7 +212,7 @@
           <a:p>
             <a:fld id="{9B7544F6-19C0-423A-BC4F-CE16586ED0A2}" type="datetimeFigureOut">
               <a:rPr kumimoji="1" lang="ja-JP" altLang="en-US" smtClean="0"/>
-              <a:t>2017/6/2</a:t>
+              <a:t>2017/6/3</a:t>
             </a:fld>
             <a:endParaRPr kumimoji="1" lang="ja-JP" altLang="en-US"/>
           </a:p>
@@ -727,7 +727,7 @@
           <a:p>
             <a:fld id="{34FAF99E-A0D5-463B-960C-AF4DABAF1138}" type="datetimeFigureOut">
               <a:rPr kumimoji="1" lang="ja-JP" altLang="en-US" smtClean="0"/>
-              <a:t>2017/6/2</a:t>
+              <a:t>2017/6/3</a:t>
             </a:fld>
             <a:endParaRPr kumimoji="1" lang="ja-JP" altLang="en-US"/>
           </a:p>
@@ -927,7 +927,7 @@
           <a:p>
             <a:fld id="{34FAF99E-A0D5-463B-960C-AF4DABAF1138}" type="datetimeFigureOut">
               <a:rPr kumimoji="1" lang="ja-JP" altLang="en-US" smtClean="0"/>
-              <a:t>2017/6/2</a:t>
+              <a:t>2017/6/3</a:t>
             </a:fld>
             <a:endParaRPr kumimoji="1" lang="ja-JP" altLang="en-US"/>
           </a:p>
@@ -1137,7 +1137,7 @@
           <a:p>
             <a:fld id="{34FAF99E-A0D5-463B-960C-AF4DABAF1138}" type="datetimeFigureOut">
               <a:rPr kumimoji="1" lang="ja-JP" altLang="en-US" smtClean="0"/>
-              <a:t>2017/6/2</a:t>
+              <a:t>2017/6/3</a:t>
             </a:fld>
             <a:endParaRPr kumimoji="1" lang="ja-JP" altLang="en-US"/>
           </a:p>
@@ -1337,7 +1337,7 @@
           <a:p>
             <a:fld id="{34FAF99E-A0D5-463B-960C-AF4DABAF1138}" type="datetimeFigureOut">
               <a:rPr kumimoji="1" lang="ja-JP" altLang="en-US" smtClean="0"/>
-              <a:t>2017/6/2</a:t>
+              <a:t>2017/6/3</a:t>
             </a:fld>
             <a:endParaRPr kumimoji="1" lang="ja-JP" altLang="en-US"/>
           </a:p>
@@ -1582,7 +1582,7 @@
           <a:p>
             <a:fld id="{34FAF99E-A0D5-463B-960C-AF4DABAF1138}" type="datetimeFigureOut">
               <a:rPr kumimoji="1" lang="ja-JP" altLang="en-US" smtClean="0"/>
-              <a:t>2017/6/2</a:t>
+              <a:t>2017/6/3</a:t>
             </a:fld>
             <a:endParaRPr kumimoji="1" lang="ja-JP" altLang="en-US"/>
           </a:p>
@@ -1875,7 +1875,7 @@
           <a:p>
             <a:fld id="{34FAF99E-A0D5-463B-960C-AF4DABAF1138}" type="datetimeFigureOut">
               <a:rPr kumimoji="1" lang="ja-JP" altLang="en-US" smtClean="0"/>
-              <a:t>2017/6/2</a:t>
+              <a:t>2017/6/3</a:t>
             </a:fld>
             <a:endParaRPr kumimoji="1" lang="ja-JP" altLang="en-US"/>
           </a:p>
@@ -2303,7 +2303,7 @@
           <a:p>
             <a:fld id="{34FAF99E-A0D5-463B-960C-AF4DABAF1138}" type="datetimeFigureOut">
               <a:rPr kumimoji="1" lang="ja-JP" altLang="en-US" smtClean="0"/>
-              <a:t>2017/6/2</a:t>
+              <a:t>2017/6/3</a:t>
             </a:fld>
             <a:endParaRPr kumimoji="1" lang="ja-JP" altLang="en-US"/>
           </a:p>
@@ -2420,7 +2420,7 @@
           <a:p>
             <a:fld id="{34FAF99E-A0D5-463B-960C-AF4DABAF1138}" type="datetimeFigureOut">
               <a:rPr kumimoji="1" lang="ja-JP" altLang="en-US" smtClean="0"/>
-              <a:t>2017/6/2</a:t>
+              <a:t>2017/6/3</a:t>
             </a:fld>
             <a:endParaRPr kumimoji="1" lang="ja-JP" altLang="en-US"/>
           </a:p>
@@ -2515,7 +2515,7 @@
           <a:p>
             <a:fld id="{34FAF99E-A0D5-463B-960C-AF4DABAF1138}" type="datetimeFigureOut">
               <a:rPr kumimoji="1" lang="ja-JP" altLang="en-US" smtClean="0"/>
-              <a:t>2017/6/2</a:t>
+              <a:t>2017/6/3</a:t>
             </a:fld>
             <a:endParaRPr kumimoji="1" lang="ja-JP" altLang="en-US"/>
           </a:p>
@@ -2822,7 +2822,7 @@
           <a:p>
             <a:fld id="{34FAF99E-A0D5-463B-960C-AF4DABAF1138}" type="datetimeFigureOut">
               <a:rPr kumimoji="1" lang="ja-JP" altLang="en-US" smtClean="0"/>
-              <a:t>2017/6/2</a:t>
+              <a:t>2017/6/3</a:t>
             </a:fld>
             <a:endParaRPr kumimoji="1" lang="ja-JP" altLang="en-US"/>
           </a:p>
@@ -3074,7 +3074,7 @@
           <a:p>
             <a:fld id="{34FAF99E-A0D5-463B-960C-AF4DABAF1138}" type="datetimeFigureOut">
               <a:rPr kumimoji="1" lang="ja-JP" altLang="en-US" smtClean="0"/>
-              <a:t>2017/6/2</a:t>
+              <a:t>2017/6/3</a:t>
             </a:fld>
             <a:endParaRPr kumimoji="1" lang="ja-JP" altLang="en-US"/>
           </a:p>
@@ -3317,7 +3317,7 @@
           <a:p>
             <a:fld id="{34FAF99E-A0D5-463B-960C-AF4DABAF1138}" type="datetimeFigureOut">
               <a:rPr kumimoji="1" lang="ja-JP" altLang="en-US" smtClean="0"/>
-              <a:t>2017/6/2</a:t>
+              <a:t>2017/6/3</a:t>
             </a:fld>
             <a:endParaRPr kumimoji="1" lang="ja-JP" altLang="en-US"/>
           </a:p>
@@ -3952,7 +3952,7 @@
           <a:p>
             <a:r>
               <a:rPr kumimoji="1" lang="ja-JP" altLang="en-US" dirty="0"/>
-              <a:t>現状</a:t>
+              <a:t>ストローク</a:t>
             </a:r>
           </a:p>
         </p:txBody>
@@ -3969,27 +3969,43 @@
         </p:nvSpPr>
         <p:spPr/>
         <p:txBody>
-          <a:bodyPr/>
+          <a:bodyPr>
+            <a:normAutofit lnSpcReduction="10000"/>
+          </a:bodyPr>
           <a:lstStyle/>
           <a:p>
             <a:r>
               <a:rPr kumimoji="1" lang="ja-JP" altLang="en-US" dirty="0"/>
-              <a:t>弾く練習はできる</a:t>
+              <a:t>６本の弦を一気に弾く</a:t>
             </a:r>
             <a:endParaRPr kumimoji="1" lang="en-US" altLang="ja-JP" dirty="0"/>
           </a:p>
           <a:p>
             <a:r>
               <a:rPr lang="ja-JP" altLang="en-US" dirty="0"/>
-              <a:t>それで分かったこと</a:t>
+              <a:t>脱力</a:t>
             </a:r>
             <a:endParaRPr lang="en-US" altLang="ja-JP" dirty="0"/>
           </a:p>
           <a:p>
+            <a:r>
+              <a:rPr kumimoji="1" lang="ja-JP" altLang="en-US" dirty="0"/>
+              <a:t>キーボードで複数のキーを使う</a:t>
+            </a:r>
+            <a:endParaRPr kumimoji="1" lang="en-US" altLang="ja-JP" dirty="0"/>
+          </a:p>
+          <a:p>
+            <a:r>
+              <a:rPr lang="ja-JP" altLang="en-US" dirty="0"/>
+              <a:t>方向</a:t>
+            </a:r>
+            <a:endParaRPr kumimoji="1" lang="en-US" altLang="ja-JP" dirty="0"/>
+          </a:p>
+          <a:p>
             <a:pPr lvl="1"/>
             <a:r>
               <a:rPr lang="ja-JP" altLang="en-US" dirty="0"/>
-              <a:t>ギターの音っぽくはない</a:t>
+              <a:t>ダウンストローク</a:t>
             </a:r>
             <a:endParaRPr lang="en-US" altLang="ja-JP" dirty="0"/>
           </a:p>
@@ -3997,32 +4013,95 @@
             <a:pPr lvl="1"/>
             <a:r>
               <a:rPr kumimoji="1" lang="ja-JP" altLang="en-US" dirty="0"/>
-              <a:t>弾き語りが簡単になどなってない</a:t>
+              <a:t>アップストローク</a:t>
+            </a:r>
+            <a:r>
+              <a:rPr kumimoji="1" lang="en-US" altLang="ja-JP" dirty="0"/>
+              <a:t>	</a:t>
+            </a:r>
+            <a:r>
+              <a:rPr kumimoji="1" lang="ja-JP" altLang="en-US" dirty="0"/>
+              <a:t>ダウンより音が鳴りにくい？</a:t>
             </a:r>
             <a:endParaRPr kumimoji="1" lang="en-US" altLang="ja-JP" dirty="0"/>
           </a:p>
           <a:p>
+            <a:r>
+              <a:rPr lang="ja-JP" altLang="en-US" dirty="0"/>
+              <a:t>基本の弾き方</a:t>
+            </a:r>
+            <a:endParaRPr kumimoji="1" lang="en-US" altLang="ja-JP" dirty="0"/>
+          </a:p>
+          <a:p>
             <a:pPr lvl="1"/>
             <a:r>
               <a:rPr lang="ja-JP" altLang="en-US" dirty="0"/>
-              <a:t>音の修正がめ</a:t>
-            </a:r>
-            <a:r>
-              <a:rPr lang="ja-JP" altLang="en-US" dirty="0" err="1"/>
-              <a:t>んど</a:t>
-            </a:r>
-            <a:r>
-              <a:rPr lang="ja-JP" altLang="en-US"/>
-              <a:t>くさい</a:t>
+              <a:t>ダウン</a:t>
+            </a:r>
+            <a:r>
+              <a:rPr lang="en-US" altLang="ja-JP" dirty="0"/>
+              <a:t>&gt;</a:t>
+            </a:r>
+            <a:r>
+              <a:rPr lang="ja-JP" altLang="en-US" dirty="0"/>
+              <a:t>ダウン</a:t>
+            </a:r>
+            <a:r>
+              <a:rPr lang="en-US" altLang="ja-JP" dirty="0"/>
+              <a:t>&gt;</a:t>
+            </a:r>
+            <a:r>
+              <a:rPr lang="ja-JP" altLang="en-US" dirty="0"/>
+              <a:t>アップ</a:t>
+            </a:r>
+            <a:r>
+              <a:rPr lang="en-US" altLang="ja-JP" dirty="0"/>
+              <a:t>&gt;</a:t>
+            </a:r>
+            <a:r>
+              <a:rPr lang="ja-JP" altLang="en-US" dirty="0"/>
+              <a:t>アップ</a:t>
+            </a:r>
+            <a:r>
+              <a:rPr lang="en-US" altLang="ja-JP" dirty="0"/>
+              <a:t>&gt;</a:t>
+            </a:r>
+            <a:r>
+              <a:rPr lang="ja-JP" altLang="en-US" dirty="0"/>
+              <a:t>ダウン</a:t>
+            </a:r>
+            <a:r>
+              <a:rPr lang="en-US" altLang="ja-JP" dirty="0"/>
+              <a:t>&gt;</a:t>
+            </a:r>
+            <a:r>
+              <a:rPr lang="ja-JP" altLang="en-US" dirty="0"/>
+              <a:t>アップ</a:t>
             </a:r>
             <a:endParaRPr lang="en-US" altLang="ja-JP" dirty="0"/>
+          </a:p>
+          <a:p>
+            <a:pPr lvl="1"/>
+            <a:r>
+              <a:rPr kumimoji="1" lang="ja-JP" altLang="en-US" dirty="0"/>
+              <a:t>当たってるか当たってないかがリズムを生む</a:t>
+            </a:r>
+            <a:endParaRPr kumimoji="1" lang="en-US" altLang="ja-JP" dirty="0"/>
+          </a:p>
+          <a:p>
+            <a:pPr lvl="1"/>
+            <a:r>
+              <a:rPr lang="ja-JP" altLang="en-US" dirty="0"/>
+              <a:t>腕を振るスピードはたぶん同じ</a:t>
+            </a:r>
+            <a:endParaRPr kumimoji="1" lang="ja-JP" altLang="en-US" dirty="0"/>
           </a:p>
         </p:txBody>
       </p:sp>
     </p:spTree>
     <p:extLst>
       <p:ext uri="{BB962C8B-B14F-4D97-AF65-F5344CB8AC3E}">
-        <p14:creationId xmlns:p14="http://schemas.microsoft.com/office/powerpoint/2010/main" val="1302768076"/>
+        <p14:creationId xmlns:p14="http://schemas.microsoft.com/office/powerpoint/2010/main" val="3826982934"/>
       </p:ext>
     </p:extLst>
   </p:cSld>
@@ -4066,7 +4145,7 @@
           <a:p>
             <a:r>
               <a:rPr kumimoji="1" lang="ja-JP" altLang="en-US" dirty="0"/>
-              <a:t>ストローク</a:t>
+              <a:t>弦は６本</a:t>
             </a:r>
           </a:p>
         </p:txBody>
@@ -4083,130 +4162,26 @@
         </p:nvSpPr>
         <p:spPr/>
         <p:txBody>
-          <a:bodyPr>
-            <a:normAutofit lnSpcReduction="10000"/>
-          </a:bodyPr>
+          <a:bodyPr/>
           <a:lstStyle/>
           <a:p>
             <a:r>
               <a:rPr kumimoji="1" lang="ja-JP" altLang="en-US" dirty="0"/>
-              <a:t>６本の弦を一気に弾く</a:t>
+              <a:t>音が６つ出る？</a:t>
             </a:r>
             <a:endParaRPr kumimoji="1" lang="en-US" altLang="ja-JP" dirty="0"/>
           </a:p>
           <a:p>
             <a:r>
               <a:rPr lang="ja-JP" altLang="en-US" dirty="0"/>
-              <a:t>脱力</a:t>
+              <a:t>上４本がベースと同じ</a:t>
             </a:r>
             <a:endParaRPr lang="en-US" altLang="ja-JP" dirty="0"/>
           </a:p>
           <a:p>
             <a:r>
-              <a:rPr kumimoji="1" lang="ja-JP" altLang="en-US" dirty="0"/>
-              <a:t>キーボードで複数のキーを使う</a:t>
-            </a:r>
-            <a:endParaRPr kumimoji="1" lang="en-US" altLang="ja-JP" dirty="0"/>
-          </a:p>
-          <a:p>
-            <a:r>
-              <a:rPr lang="ja-JP" altLang="en-US" dirty="0"/>
-              <a:t>方向</a:t>
-            </a:r>
-            <a:endParaRPr kumimoji="1" lang="en-US" altLang="ja-JP" dirty="0"/>
-          </a:p>
-          <a:p>
-            <a:pPr lvl="1"/>
-            <a:r>
-              <a:rPr lang="ja-JP" altLang="en-US" dirty="0"/>
-              <a:t>ダウンストローク</a:t>
-            </a:r>
-            <a:endParaRPr lang="en-US" altLang="ja-JP" dirty="0"/>
-          </a:p>
-          <a:p>
-            <a:pPr lvl="1"/>
-            <a:r>
-              <a:rPr kumimoji="1" lang="ja-JP" altLang="en-US" dirty="0"/>
-              <a:t>アップストローク</a:t>
-            </a:r>
-            <a:r>
-              <a:rPr kumimoji="1" lang="en-US" altLang="ja-JP" dirty="0"/>
-              <a:t>	</a:t>
-            </a:r>
-            <a:r>
-              <a:rPr kumimoji="1" lang="ja-JP" altLang="en-US" dirty="0"/>
-              <a:t>ダウンより音が鳴りにくい？</a:t>
-            </a:r>
-            <a:endParaRPr kumimoji="1" lang="en-US" altLang="ja-JP" dirty="0"/>
-          </a:p>
-          <a:p>
-            <a:r>
-              <a:rPr lang="ja-JP" altLang="en-US" dirty="0"/>
-              <a:t>基本の弾き方</a:t>
-            </a:r>
-            <a:endParaRPr kumimoji="1" lang="en-US" altLang="ja-JP" dirty="0"/>
-          </a:p>
-          <a:p>
-            <a:pPr lvl="1"/>
-            <a:r>
-              <a:rPr lang="ja-JP" altLang="en-US" dirty="0"/>
-              <a:t>ダウン</a:t>
-            </a:r>
-            <a:r>
-              <a:rPr lang="en-US" altLang="ja-JP" dirty="0"/>
-              <a:t>&gt;</a:t>
-            </a:r>
-            <a:r>
-              <a:rPr lang="ja-JP" altLang="en-US" dirty="0"/>
-              <a:t>ダウン</a:t>
-            </a:r>
-            <a:r>
-              <a:rPr lang="en-US" altLang="ja-JP" dirty="0"/>
-              <a:t>&gt;</a:t>
-            </a:r>
-            <a:r>
-              <a:rPr lang="ja-JP" altLang="en-US" dirty="0"/>
-              <a:t>アップ</a:t>
-            </a:r>
-            <a:r>
-              <a:rPr lang="en-US" altLang="ja-JP" dirty="0"/>
-              <a:t>&gt;</a:t>
-            </a:r>
-            <a:r>
-              <a:rPr lang="ja-JP" altLang="en-US" dirty="0"/>
-              <a:t>アップ</a:t>
-            </a:r>
-            <a:r>
-              <a:rPr lang="en-US" altLang="ja-JP" dirty="0"/>
-              <a:t>&gt;</a:t>
-            </a:r>
-            <a:r>
-              <a:rPr lang="ja-JP" altLang="en-US" dirty="0"/>
-              <a:t>ダウン</a:t>
-            </a:r>
-            <a:r>
-              <a:rPr lang="en-US" altLang="ja-JP" dirty="0"/>
-              <a:t>&gt;</a:t>
-            </a:r>
-            <a:r>
-              <a:rPr lang="ja-JP" altLang="en-US" dirty="0"/>
-              <a:t>アップ</a:t>
-            </a:r>
-            <a:endParaRPr lang="en-US" altLang="ja-JP" dirty="0"/>
-          </a:p>
-          <a:p>
-            <a:pPr lvl="1"/>
-            <a:r>
-              <a:rPr kumimoji="1" lang="ja-JP" altLang="en-US" dirty="0"/>
-              <a:t>当たってるか当たってないかがリズムを生む</a:t>
-            </a:r>
-            <a:endParaRPr kumimoji="1" lang="en-US" altLang="ja-JP" dirty="0"/>
-          </a:p>
-          <a:p>
-            <a:pPr lvl="1"/>
-            <a:r>
-              <a:rPr lang="ja-JP" altLang="en-US" dirty="0"/>
-              <a:t>腕を振るスピードはたぶん同じ</a:t>
+              <a:rPr kumimoji="1" lang="ja-JP" altLang="en-US"/>
+              <a:t>残りは？　オクターブ違い？</a:t>
             </a:r>
             <a:endParaRPr kumimoji="1" lang="ja-JP" altLang="en-US" dirty="0"/>
           </a:p>
@@ -4215,7 +4190,7 @@
     </p:spTree>
     <p:extLst>
       <p:ext uri="{BB962C8B-B14F-4D97-AF65-F5344CB8AC3E}">
-        <p14:creationId xmlns:p14="http://schemas.microsoft.com/office/powerpoint/2010/main" val="3826982934"/>
+        <p14:creationId xmlns:p14="http://schemas.microsoft.com/office/powerpoint/2010/main" val="2443643365"/>
       </p:ext>
     </p:extLst>
   </p:cSld>
@@ -4226,7 +4201,7 @@
 </file>
 
 <file path=ppt/slides/slide13.xml><?xml version="1.0" encoding="utf-8"?>
-<p:sld xmlns:a="http://schemas.openxmlformats.org/drawingml/2006/main" xmlns:r="http://schemas.openxmlformats.org/officeDocument/2006/relationships" xmlns:p="http://schemas.openxmlformats.org/presentationml/2006/main">
+<p:sld xmlns:a="http://schemas.openxmlformats.org/drawingml/2006/main" xmlns:r="http://schemas.openxmlformats.org/officeDocument/2006/relationships" xmlns:p="http://schemas.openxmlformats.org/presentationml/2006/main" show="0">
   <p:cSld>
     <p:spTree>
       <p:nvGrpSpPr>
@@ -4259,7 +4234,7 @@
           <a:p>
             <a:r>
               <a:rPr kumimoji="1" lang="ja-JP" altLang="en-US" dirty="0"/>
-              <a:t>弦は６本</a:t>
+              <a:t>現状整理</a:t>
             </a:r>
           </a:p>
         </p:txBody>
@@ -4280,31 +4255,40 @@
           <a:lstStyle/>
           <a:p>
             <a:r>
+              <a:rPr lang="ja-JP" altLang="en-US" dirty="0"/>
+              <a:t>今のままではぜんぜん駄目</a:t>
+            </a:r>
+            <a:endParaRPr kumimoji="1" lang="en-US" altLang="ja-JP" dirty="0"/>
+          </a:p>
+          <a:p>
+            <a:r>
+              <a:rPr lang="ja-JP" altLang="en-US" dirty="0"/>
+              <a:t>次のトライに必要なもの</a:t>
+            </a:r>
+            <a:endParaRPr kumimoji="1" lang="en-US" altLang="ja-JP" dirty="0"/>
+          </a:p>
+          <a:p>
+            <a:pPr lvl="1"/>
+            <a:r>
+              <a:rPr lang="ja-JP" altLang="en-US" dirty="0"/>
+              <a:t>ギターの音源</a:t>
+            </a:r>
+            <a:endParaRPr lang="en-US" altLang="ja-JP" dirty="0"/>
+          </a:p>
+          <a:p>
+            <a:pPr lvl="1"/>
+            <a:r>
               <a:rPr kumimoji="1" lang="ja-JP" altLang="en-US" dirty="0"/>
-              <a:t>音が６つ出る？</a:t>
+              <a:t>ギターの音源を同時に鳴らして汚くならないこと</a:t>
             </a:r>
             <a:endParaRPr kumimoji="1" lang="en-US" altLang="ja-JP" dirty="0"/>
-          </a:p>
-          <a:p>
-            <a:r>
-              <a:rPr lang="ja-JP" altLang="en-US" dirty="0"/>
-              <a:t>上４本がベースと同じ</a:t>
-            </a:r>
-            <a:endParaRPr lang="en-US" altLang="ja-JP" dirty="0"/>
-          </a:p>
-          <a:p>
-            <a:r>
-              <a:rPr kumimoji="1" lang="ja-JP" altLang="en-US"/>
-              <a:t>残りは？　オクターブ違い？</a:t>
-            </a:r>
-            <a:endParaRPr kumimoji="1" lang="ja-JP" altLang="en-US" dirty="0"/>
           </a:p>
         </p:txBody>
       </p:sp>
     </p:spTree>
     <p:extLst>
       <p:ext uri="{BB962C8B-B14F-4D97-AF65-F5344CB8AC3E}">
-        <p14:creationId xmlns:p14="http://schemas.microsoft.com/office/powerpoint/2010/main" val="2443643365"/>
+        <p14:creationId xmlns:p14="http://schemas.microsoft.com/office/powerpoint/2010/main" val="4020479301"/>
       </p:ext>
     </p:extLst>
   </p:cSld>
@@ -4441,7 +4425,7 @@
           <a:p>
             <a:r>
               <a:rPr kumimoji="1" lang="ja-JP" altLang="en-US" dirty="0"/>
-              <a:t>現状整理</a:t>
+              <a:t>現状</a:t>
             </a:r>
           </a:p>
         </p:txBody>
@@ -4462,40 +4446,56 @@
           <a:lstStyle/>
           <a:p>
             <a:r>
+              <a:rPr kumimoji="1" lang="ja-JP" altLang="en-US" dirty="0"/>
+              <a:t>弾く練習はできる</a:t>
+            </a:r>
+            <a:endParaRPr kumimoji="1" lang="en-US" altLang="ja-JP" dirty="0"/>
+          </a:p>
+          <a:p>
+            <a:r>
               <a:rPr lang="ja-JP" altLang="en-US" dirty="0"/>
-              <a:t>今のままではぜんぜん駄目</a:t>
+              <a:t>それで分かったこと</a:t>
+            </a:r>
+            <a:endParaRPr lang="en-US" altLang="ja-JP" dirty="0"/>
+          </a:p>
+          <a:p>
+            <a:pPr lvl="1"/>
+            <a:r>
+              <a:rPr lang="ja-JP" altLang="en-US" dirty="0"/>
+              <a:t>ギターの音っぽくはない</a:t>
+            </a:r>
+            <a:endParaRPr lang="en-US" altLang="ja-JP" dirty="0"/>
+          </a:p>
+          <a:p>
+            <a:pPr lvl="1"/>
+            <a:r>
+              <a:rPr kumimoji="1" lang="ja-JP" altLang="en-US" dirty="0"/>
+              <a:t>弾き語りが簡単になどなってない</a:t>
             </a:r>
             <a:endParaRPr kumimoji="1" lang="en-US" altLang="ja-JP" dirty="0"/>
           </a:p>
           <a:p>
+            <a:pPr lvl="1"/>
             <a:r>
               <a:rPr lang="ja-JP" altLang="en-US" dirty="0"/>
-              <a:t>次のトライに必要なもの</a:t>
-            </a:r>
-            <a:endParaRPr kumimoji="1" lang="en-US" altLang="ja-JP" dirty="0"/>
-          </a:p>
-          <a:p>
-            <a:pPr lvl="1"/>
-            <a:r>
-              <a:rPr lang="ja-JP" altLang="en-US" dirty="0"/>
-              <a:t>ギターの音源</a:t>
+              <a:t>音の修正がめ</a:t>
+            </a:r>
+            <a:r>
+              <a:rPr lang="ja-JP" altLang="en-US" dirty="0" err="1"/>
+              <a:t>んど</a:t>
+            </a:r>
+            <a:r>
+              <a:rPr lang="ja-JP" altLang="en-US"/>
+              <a:t>くさい</a:t>
             </a:r>
             <a:endParaRPr lang="en-US" altLang="ja-JP" dirty="0"/>
-          </a:p>
-          <a:p>
-            <a:pPr lvl="1"/>
-            <a:r>
-              <a:rPr kumimoji="1" lang="ja-JP" altLang="en-US" dirty="0"/>
-              <a:t>ギターの音源を同時に鳴らして汚くならないこと</a:t>
-            </a:r>
-            <a:endParaRPr kumimoji="1" lang="en-US" altLang="ja-JP" dirty="0"/>
           </a:p>
         </p:txBody>
       </p:sp>
     </p:spTree>
     <p:extLst>
       <p:ext uri="{BB962C8B-B14F-4D97-AF65-F5344CB8AC3E}">
-        <p14:creationId xmlns:p14="http://schemas.microsoft.com/office/powerpoint/2010/main" val="4020479301"/>
+        <p14:creationId xmlns:p14="http://schemas.microsoft.com/office/powerpoint/2010/main" val="1302768076"/>
       </p:ext>
     </p:extLst>
   </p:cSld>

</xml_diff>